<commit_message>
doc: the final powerpoint
</commit_message>
<xml_diff>
--- a/Notes de formation AGU.pptx
+++ b/Notes de formation AGU.pptx
@@ -22,8 +22,10 @@
     <p:sldId id="272" r:id="rId16"/>
     <p:sldId id="273" r:id="rId17"/>
     <p:sldId id="274" r:id="rId18"/>
-    <p:sldId id="269" r:id="rId19"/>
-    <p:sldId id="263" r:id="rId20"/>
+    <p:sldId id="275" r:id="rId19"/>
+    <p:sldId id="276" r:id="rId20"/>
+    <p:sldId id="269" r:id="rId21"/>
+    <p:sldId id="263" r:id="rId22"/>
   </p:sldIdLst>
   <p:sldSz cx="12192000" cy="6858000"/>
   <p:notesSz cx="6858000" cy="9144000"/>
@@ -261,7 +263,7 @@
           <a:p>
             <a:fld id="{9C9D1B3E-B31D-45B4-80FB-AD5C55BBAA43}" type="datetimeFigureOut">
               <a:rPr lang="fr-FR" smtClean="0"/>
-              <a:t>23/09/2021</a:t>
+              <a:t>24/09/2021</a:t>
             </a:fld>
             <a:endParaRPr lang="fr-FR"/>
           </a:p>
@@ -431,7 +433,7 @@
           <a:p>
             <a:fld id="{9C9D1B3E-B31D-45B4-80FB-AD5C55BBAA43}" type="datetimeFigureOut">
               <a:rPr lang="fr-FR" smtClean="0"/>
-              <a:t>23/09/2021</a:t>
+              <a:t>24/09/2021</a:t>
             </a:fld>
             <a:endParaRPr lang="fr-FR"/>
           </a:p>
@@ -611,7 +613,7 @@
           <a:p>
             <a:fld id="{9C9D1B3E-B31D-45B4-80FB-AD5C55BBAA43}" type="datetimeFigureOut">
               <a:rPr lang="fr-FR" smtClean="0"/>
-              <a:t>23/09/2021</a:t>
+              <a:t>24/09/2021</a:t>
             </a:fld>
             <a:endParaRPr lang="fr-FR"/>
           </a:p>
@@ -781,7 +783,7 @@
           <a:p>
             <a:fld id="{9C9D1B3E-B31D-45B4-80FB-AD5C55BBAA43}" type="datetimeFigureOut">
               <a:rPr lang="fr-FR" smtClean="0"/>
-              <a:t>23/09/2021</a:t>
+              <a:t>24/09/2021</a:t>
             </a:fld>
             <a:endParaRPr lang="fr-FR"/>
           </a:p>
@@ -1027,7 +1029,7 @@
           <a:p>
             <a:fld id="{9C9D1B3E-B31D-45B4-80FB-AD5C55BBAA43}" type="datetimeFigureOut">
               <a:rPr lang="fr-FR" smtClean="0"/>
-              <a:t>23/09/2021</a:t>
+              <a:t>24/09/2021</a:t>
             </a:fld>
             <a:endParaRPr lang="fr-FR"/>
           </a:p>
@@ -1259,7 +1261,7 @@
           <a:p>
             <a:fld id="{9C9D1B3E-B31D-45B4-80FB-AD5C55BBAA43}" type="datetimeFigureOut">
               <a:rPr lang="fr-FR" smtClean="0"/>
-              <a:t>23/09/2021</a:t>
+              <a:t>24/09/2021</a:t>
             </a:fld>
             <a:endParaRPr lang="fr-FR"/>
           </a:p>
@@ -1626,7 +1628,7 @@
           <a:p>
             <a:fld id="{9C9D1B3E-B31D-45B4-80FB-AD5C55BBAA43}" type="datetimeFigureOut">
               <a:rPr lang="fr-FR" smtClean="0"/>
-              <a:t>23/09/2021</a:t>
+              <a:t>24/09/2021</a:t>
             </a:fld>
             <a:endParaRPr lang="fr-FR"/>
           </a:p>
@@ -1744,7 +1746,7 @@
           <a:p>
             <a:fld id="{9C9D1B3E-B31D-45B4-80FB-AD5C55BBAA43}" type="datetimeFigureOut">
               <a:rPr lang="fr-FR" smtClean="0"/>
-              <a:t>23/09/2021</a:t>
+              <a:t>24/09/2021</a:t>
             </a:fld>
             <a:endParaRPr lang="fr-FR"/>
           </a:p>
@@ -1839,7 +1841,7 @@
           <a:p>
             <a:fld id="{9C9D1B3E-B31D-45B4-80FB-AD5C55BBAA43}" type="datetimeFigureOut">
               <a:rPr lang="fr-FR" smtClean="0"/>
-              <a:t>23/09/2021</a:t>
+              <a:t>24/09/2021</a:t>
             </a:fld>
             <a:endParaRPr lang="fr-FR"/>
           </a:p>
@@ -2116,7 +2118,7 @@
           <a:p>
             <a:fld id="{9C9D1B3E-B31D-45B4-80FB-AD5C55BBAA43}" type="datetimeFigureOut">
               <a:rPr lang="fr-FR" smtClean="0"/>
-              <a:t>23/09/2021</a:t>
+              <a:t>24/09/2021</a:t>
             </a:fld>
             <a:endParaRPr lang="fr-FR"/>
           </a:p>
@@ -2369,7 +2371,7 @@
           <a:p>
             <a:fld id="{9C9D1B3E-B31D-45B4-80FB-AD5C55BBAA43}" type="datetimeFigureOut">
               <a:rPr lang="fr-FR" smtClean="0"/>
-              <a:t>23/09/2021</a:t>
+              <a:t>24/09/2021</a:t>
             </a:fld>
             <a:endParaRPr lang="fr-FR"/>
           </a:p>
@@ -2582,7 +2584,7 @@
           <a:p>
             <a:fld id="{9C9D1B3E-B31D-45B4-80FB-AD5C55BBAA43}" type="datetimeFigureOut">
               <a:rPr lang="fr-FR" smtClean="0"/>
-              <a:t>23/09/2021</a:t>
+              <a:t>24/09/2021</a:t>
             </a:fld>
             <a:endParaRPr lang="fr-FR"/>
           </a:p>
@@ -7492,135 +7494,334 @@
           <a:p>
             <a:r>
               <a:rPr lang="fr-FR" dirty="0" smtClean="0"/>
-              <a:t>REST</a:t>
+              <a:t>(</a:t>
+            </a:r>
+            <a:r>
+              <a:rPr lang="fr-FR" dirty="0" err="1" smtClean="0"/>
+              <a:t>behavior</a:t>
+            </a:r>
+            <a:r>
+              <a:rPr lang="fr-FR" dirty="0" smtClean="0"/>
+              <a:t>)</a:t>
+            </a:r>
+            <a:r>
+              <a:rPr lang="fr-FR" dirty="0" err="1" smtClean="0"/>
+              <a:t>Subject</a:t>
             </a:r>
             <a:endParaRPr lang="fr-FR" dirty="0"/>
           </a:p>
         </p:txBody>
       </p:sp>
-      <p:sp>
-        <p:nvSpPr>
-          <p:cNvPr id="3" name="Espace réservé du contenu 2"/>
-          <p:cNvSpPr>
-            <a:spLocks noGrp="1"/>
-          </p:cNvSpPr>
-          <p:nvPr>
-            <p:ph idx="1"/>
-          </p:nvPr>
-        </p:nvSpPr>
-        <p:spPr/>
-        <p:txBody>
-          <a:bodyPr/>
-          <a:lstStyle/>
-          <a:p>
-            <a:r>
-              <a:rPr lang="fr-FR" dirty="0" smtClean="0"/>
-              <a:t>CRUD : </a:t>
+      <p:cxnSp>
+        <p:nvCxnSpPr>
+          <p:cNvPr id="5" name="Connecteur droit avec flèche 4"/>
+          <p:cNvCxnSpPr/>
+          <p:nvPr/>
+        </p:nvCxnSpPr>
+        <p:spPr>
+          <a:xfrm>
+            <a:off x="281354" y="2757268"/>
+            <a:ext cx="11746523" cy="42203"/>
+          </a:xfrm>
+          <a:prstGeom prst="straightConnector1">
+            <a:avLst/>
+          </a:prstGeom>
+          <a:ln w="76200">
+            <a:tailEnd type="triangle"/>
+          </a:ln>
+        </p:spPr>
+        <p:style>
+          <a:lnRef idx="1">
+            <a:schemeClr val="accent1"/>
+          </a:lnRef>
+          <a:fillRef idx="0">
+            <a:schemeClr val="accent1"/>
+          </a:fillRef>
+          <a:effectRef idx="0">
+            <a:schemeClr val="accent1"/>
+          </a:effectRef>
+          <a:fontRef idx="minor">
+            <a:schemeClr val="tx1"/>
+          </a:fontRef>
+        </p:style>
+      </p:cxnSp>
+      <p:cxnSp>
+        <p:nvCxnSpPr>
+          <p:cNvPr id="7" name="Connecteur droit 6"/>
+          <p:cNvCxnSpPr/>
+          <p:nvPr/>
+        </p:nvCxnSpPr>
+        <p:spPr>
+          <a:xfrm flipH="1">
+            <a:off x="675249" y="2349305"/>
+            <a:ext cx="14068" cy="900332"/>
+          </a:xfrm>
+          <a:prstGeom prst="line">
+            <a:avLst/>
+          </a:prstGeom>
+          <a:ln w="76200"/>
+        </p:spPr>
+        <p:style>
+          <a:lnRef idx="1">
+            <a:schemeClr val="accent1"/>
+          </a:lnRef>
+          <a:fillRef idx="0">
+            <a:schemeClr val="accent1"/>
+          </a:fillRef>
+          <a:effectRef idx="0">
+            <a:schemeClr val="accent1"/>
+          </a:effectRef>
+          <a:fontRef idx="minor">
+            <a:schemeClr val="tx1"/>
+          </a:fontRef>
+        </p:style>
+      </p:cxnSp>
+      <p:sp>
+        <p:nvSpPr>
+          <p:cNvPr id="9" name="Ellipse 8"/>
+          <p:cNvSpPr/>
+          <p:nvPr/>
+        </p:nvSpPr>
+        <p:spPr>
+          <a:xfrm>
+            <a:off x="1688123" y="2475914"/>
+            <a:ext cx="633046" cy="604911"/>
+          </a:xfrm>
+          <a:prstGeom prst="ellipse">
+            <a:avLst/>
+          </a:prstGeom>
+        </p:spPr>
+        <p:style>
+          <a:lnRef idx="2">
+            <a:schemeClr val="accent1">
+              <a:shade val="50000"/>
+            </a:schemeClr>
+          </a:lnRef>
+          <a:fillRef idx="1">
+            <a:schemeClr val="accent1"/>
+          </a:fillRef>
+          <a:effectRef idx="0">
+            <a:schemeClr val="accent1"/>
+          </a:effectRef>
+          <a:fontRef idx="minor">
+            <a:schemeClr val="lt1"/>
+          </a:fontRef>
+        </p:style>
+        <p:txBody>
+          <a:bodyPr rtlCol="0" anchor="ctr"/>
+          <a:lstStyle/>
+          <a:p>
+            <a:pPr algn="ctr"/>
+            <a:endParaRPr lang="fr-FR"/>
+          </a:p>
+        </p:txBody>
+      </p:sp>
+      <p:sp>
+        <p:nvSpPr>
+          <p:cNvPr id="10" name="Ellipse 9"/>
+          <p:cNvSpPr/>
+          <p:nvPr/>
+        </p:nvSpPr>
+        <p:spPr>
+          <a:xfrm>
+            <a:off x="3770142" y="2349305"/>
+            <a:ext cx="844061" cy="787790"/>
+          </a:xfrm>
+          <a:prstGeom prst="ellipse">
+            <a:avLst/>
+          </a:prstGeom>
+        </p:spPr>
+        <p:style>
+          <a:lnRef idx="2">
+            <a:schemeClr val="accent1">
+              <a:shade val="50000"/>
+            </a:schemeClr>
+          </a:lnRef>
+          <a:fillRef idx="1">
+            <a:schemeClr val="accent1"/>
+          </a:fillRef>
+          <a:effectRef idx="0">
+            <a:schemeClr val="accent1"/>
+          </a:effectRef>
+          <a:fontRef idx="minor">
+            <a:schemeClr val="lt1"/>
+          </a:fontRef>
+        </p:style>
+        <p:txBody>
+          <a:bodyPr rtlCol="0" anchor="ctr"/>
+          <a:lstStyle/>
+          <a:p>
+            <a:pPr algn="ctr"/>
+            <a:endParaRPr lang="fr-FR"/>
+          </a:p>
+        </p:txBody>
+      </p:sp>
+      <p:sp>
+        <p:nvSpPr>
+          <p:cNvPr id="11" name="Ellipse 10"/>
+          <p:cNvSpPr/>
+          <p:nvPr/>
+        </p:nvSpPr>
+        <p:spPr>
+          <a:xfrm>
+            <a:off x="5401994" y="2349305"/>
+            <a:ext cx="844061" cy="787790"/>
+          </a:xfrm>
+          <a:prstGeom prst="ellipse">
+            <a:avLst/>
+          </a:prstGeom>
+        </p:spPr>
+        <p:style>
+          <a:lnRef idx="2">
+            <a:schemeClr val="accent1">
+              <a:shade val="50000"/>
+            </a:schemeClr>
+          </a:lnRef>
+          <a:fillRef idx="1">
+            <a:schemeClr val="accent1"/>
+          </a:fillRef>
+          <a:effectRef idx="0">
+            <a:schemeClr val="accent1"/>
+          </a:effectRef>
+          <a:fontRef idx="minor">
+            <a:schemeClr val="lt1"/>
+          </a:fontRef>
+        </p:style>
+        <p:txBody>
+          <a:bodyPr rtlCol="0" anchor="ctr"/>
+          <a:lstStyle/>
+          <a:p>
+            <a:pPr algn="ctr"/>
+            <a:endParaRPr lang="fr-FR"/>
+          </a:p>
+        </p:txBody>
+      </p:sp>
+      <p:sp>
+        <p:nvSpPr>
+          <p:cNvPr id="12" name="Ellipse 11"/>
+          <p:cNvSpPr/>
+          <p:nvPr/>
+        </p:nvSpPr>
+        <p:spPr>
+          <a:xfrm>
+            <a:off x="9352671" y="2349305"/>
+            <a:ext cx="844061" cy="787790"/>
+          </a:xfrm>
+          <a:prstGeom prst="ellipse">
+            <a:avLst/>
+          </a:prstGeom>
+        </p:spPr>
+        <p:style>
+          <a:lnRef idx="2">
+            <a:schemeClr val="accent1">
+              <a:shade val="50000"/>
+            </a:schemeClr>
+          </a:lnRef>
+          <a:fillRef idx="1">
+            <a:schemeClr val="accent1"/>
+          </a:fillRef>
+          <a:effectRef idx="0">
+            <a:schemeClr val="accent1"/>
+          </a:effectRef>
+          <a:fontRef idx="minor">
+            <a:schemeClr val="lt1"/>
+          </a:fontRef>
+        </p:style>
+        <p:txBody>
+          <a:bodyPr rtlCol="0" anchor="ctr"/>
+          <a:lstStyle/>
+          <a:p>
+            <a:pPr algn="ctr"/>
+            <a:endParaRPr lang="fr-FR"/>
+          </a:p>
+        </p:txBody>
+      </p:sp>
+      <p:sp>
+        <p:nvSpPr>
+          <p:cNvPr id="13" name="ZoneTexte 12"/>
+          <p:cNvSpPr txBox="1"/>
+          <p:nvPr/>
+        </p:nvSpPr>
+        <p:spPr>
+          <a:xfrm>
+            <a:off x="4192172" y="1223889"/>
+            <a:ext cx="3676263" cy="369332"/>
+          </a:xfrm>
+          <a:prstGeom prst="rect">
+            <a:avLst/>
+          </a:prstGeom>
+          <a:noFill/>
+        </p:spPr>
+        <p:txBody>
+          <a:bodyPr wrap="none" rtlCol="0">
+            <a:spAutoFit/>
+          </a:bodyPr>
+          <a:lstStyle/>
+          <a:p>
+            <a:r>
+              <a:rPr lang="fr-FR" dirty="0" smtClean="0"/>
+              <a:t>Le </a:t>
             </a:r>
             <a:r>
               <a:rPr lang="fr-FR" dirty="0" err="1" smtClean="0"/>
-              <a:t>Create</a:t>
-            </a:r>
-            <a:r>
-              <a:rPr lang="fr-FR" dirty="0" smtClean="0"/>
-              <a:t> </a:t>
+              <a:t>next</a:t>
+            </a:r>
+            <a:r>
+              <a:rPr lang="fr-FR" dirty="0" smtClean="0"/>
+              <a:t> est fait de manière </a:t>
             </a:r>
             <a:r>
               <a:rPr lang="fr-FR" dirty="0" err="1" smtClean="0"/>
-              <a:t>Retrieve</a:t>
-            </a:r>
-            <a:r>
-              <a:rPr lang="fr-FR" dirty="0" smtClean="0"/>
-              <a:t> Update </a:t>
-            </a:r>
-            <a:r>
-              <a:rPr lang="fr-FR" dirty="0" err="1" smtClean="0"/>
-              <a:t>Delete</a:t>
-            </a:r>
-            <a:endParaRPr lang="fr-FR" dirty="0" smtClean="0"/>
-          </a:p>
-          <a:p>
-            <a:r>
-              <a:rPr lang="fr-FR" dirty="0" err="1" smtClean="0"/>
-              <a:t>Retrieve</a:t>
-            </a:r>
-            <a:r>
-              <a:rPr lang="fr-FR" dirty="0" smtClean="0"/>
-              <a:t> all: GET /articles (200)</a:t>
-            </a:r>
-          </a:p>
-          <a:p>
-            <a:pPr lvl="1"/>
-            <a:r>
-              <a:rPr lang="fr-FR" dirty="0" err="1" smtClean="0"/>
-              <a:t>Retrieve</a:t>
-            </a:r>
-            <a:r>
-              <a:rPr lang="fr-FR" dirty="0" smtClean="0"/>
-              <a:t> one: GET /articles/:id (200)</a:t>
-            </a:r>
-          </a:p>
-          <a:p>
-            <a:r>
-              <a:rPr lang="fr-FR" dirty="0" err="1" smtClean="0"/>
-              <a:t>Create</a:t>
-            </a:r>
-            <a:r>
-              <a:rPr lang="fr-FR" dirty="0" smtClean="0"/>
-              <a:t> one: POST /articles (201)</a:t>
-            </a:r>
-          </a:p>
-          <a:p>
-            <a:r>
-              <a:rPr lang="fr-FR" dirty="0" smtClean="0"/>
-              <a:t>Update</a:t>
-            </a:r>
-          </a:p>
-          <a:p>
-            <a:pPr lvl="1"/>
-            <a:r>
-              <a:rPr lang="fr-FR" dirty="0" smtClean="0"/>
-              <a:t>Rewrite: PUT /articles/:id (204)</a:t>
-            </a:r>
-          </a:p>
-          <a:p>
-            <a:pPr lvl="1"/>
-            <a:r>
-              <a:rPr lang="fr-FR" dirty="0" smtClean="0"/>
-              <a:t>Patch: PATCH </a:t>
-            </a:r>
-            <a:r>
-              <a:rPr lang="fr-FR" dirty="0"/>
-              <a:t>/articles/:id (</a:t>
-            </a:r>
-            <a:r>
-              <a:rPr lang="fr-FR" dirty="0" smtClean="0"/>
-              <a:t>204)</a:t>
+              <a:t>controllée</a:t>
             </a:r>
             <a:endParaRPr lang="fr-FR" dirty="0"/>
           </a:p>
-          <a:p>
-            <a:r>
-              <a:rPr lang="fr-FR" dirty="0" err="1" smtClean="0"/>
-              <a:t>Delete</a:t>
-            </a:r>
-            <a:r>
-              <a:rPr lang="fr-FR" dirty="0" smtClean="0"/>
-              <a:t> /articles</a:t>
-            </a:r>
-          </a:p>
-          <a:p>
-            <a:endParaRPr lang="fr-FR" dirty="0" smtClean="0"/>
-          </a:p>
-          <a:p>
-            <a:endParaRPr lang="fr-FR" dirty="0"/>
+        </p:txBody>
+      </p:sp>
+      <p:sp>
+        <p:nvSpPr>
+          <p:cNvPr id="14" name="Ellipse 13"/>
+          <p:cNvSpPr/>
+          <p:nvPr/>
+        </p:nvSpPr>
+        <p:spPr>
+          <a:xfrm>
+            <a:off x="365760" y="2454812"/>
+            <a:ext cx="633046" cy="604911"/>
+          </a:xfrm>
+          <a:prstGeom prst="ellipse">
+            <a:avLst/>
+          </a:prstGeom>
+        </p:spPr>
+        <p:style>
+          <a:lnRef idx="2">
+            <a:schemeClr val="accent6">
+              <a:shade val="50000"/>
+            </a:schemeClr>
+          </a:lnRef>
+          <a:fillRef idx="1">
+            <a:schemeClr val="accent6"/>
+          </a:fillRef>
+          <a:effectRef idx="0">
+            <a:schemeClr val="accent6"/>
+          </a:effectRef>
+          <a:fontRef idx="minor">
+            <a:schemeClr val="lt1"/>
+          </a:fontRef>
+        </p:style>
+        <p:txBody>
+          <a:bodyPr rtlCol="0" anchor="ctr"/>
+          <a:lstStyle/>
+          <a:p>
+            <a:pPr algn="ctr"/>
+            <a:endParaRPr lang="fr-FR"/>
           </a:p>
         </p:txBody>
       </p:sp>
     </p:spTree>
     <p:extLst>
       <p:ext uri="{BB962C8B-B14F-4D97-AF65-F5344CB8AC3E}">
-        <p14:creationId xmlns:p14="http://schemas.microsoft.com/office/powerpoint/2010/main" val="1152547774"/>
+        <p14:creationId xmlns:p14="http://schemas.microsoft.com/office/powerpoint/2010/main" val="698657446"/>
       </p:ext>
     </p:extLst>
   </p:cSld>
@@ -7664,7 +7865,7 @@
           <a:p>
             <a:r>
               <a:rPr lang="fr-FR" dirty="0" smtClean="0"/>
-              <a:t>webographie</a:t>
+              <a:t>Input output composant</a:t>
             </a:r>
             <a:endParaRPr lang="fr-FR" dirty="0"/>
           </a:p>
@@ -7672,34 +7873,223 @@
       </p:sp>
       <p:sp>
         <p:nvSpPr>
-          <p:cNvPr id="3" name="Espace réservé du contenu 2"/>
-          <p:cNvSpPr>
-            <a:spLocks noGrp="1"/>
-          </p:cNvSpPr>
-          <p:nvPr>
-            <p:ph idx="1"/>
-          </p:nvPr>
-        </p:nvSpPr>
-        <p:spPr/>
-        <p:txBody>
-          <a:bodyPr/>
-          <a:lstStyle/>
-          <a:p>
-            <a:r>
-              <a:rPr lang="en-US" dirty="0" err="1"/>
-              <a:t>susan</a:t>
-            </a:r>
-            <a:r>
-              <a:rPr lang="en-US" dirty="0"/>
-              <a:t> </a:t>
-            </a:r>
-            <a:r>
-              <a:rPr lang="en-US" dirty="0" err="1"/>
-              <a:t>weinschenk</a:t>
-            </a:r>
-            <a:r>
-              <a:rPr lang="en-US" dirty="0"/>
-              <a:t> 100 things every designer needs to know about people pdf</a:t>
+          <p:cNvPr id="4" name="Rectangle 3"/>
+          <p:cNvSpPr/>
+          <p:nvPr/>
+        </p:nvSpPr>
+        <p:spPr>
+          <a:xfrm>
+            <a:off x="1308295" y="1871003"/>
+            <a:ext cx="2096087" cy="1069145"/>
+          </a:xfrm>
+          <a:prstGeom prst="rect">
+            <a:avLst/>
+          </a:prstGeom>
+        </p:spPr>
+        <p:style>
+          <a:lnRef idx="2">
+            <a:schemeClr val="accent1">
+              <a:shade val="50000"/>
+            </a:schemeClr>
+          </a:lnRef>
+          <a:fillRef idx="1">
+            <a:schemeClr val="accent1"/>
+          </a:fillRef>
+          <a:effectRef idx="0">
+            <a:schemeClr val="accent1"/>
+          </a:effectRef>
+          <a:fontRef idx="minor">
+            <a:schemeClr val="lt1"/>
+          </a:fontRef>
+        </p:style>
+        <p:txBody>
+          <a:bodyPr rtlCol="0" anchor="ctr"/>
+          <a:lstStyle/>
+          <a:p>
+            <a:pPr algn="ctr"/>
+            <a:r>
+              <a:rPr lang="fr-FR" dirty="0" smtClean="0"/>
+              <a:t>Stock</a:t>
+            </a:r>
+            <a:endParaRPr lang="fr-FR" dirty="0"/>
+          </a:p>
+        </p:txBody>
+      </p:sp>
+      <p:sp>
+        <p:nvSpPr>
+          <p:cNvPr id="5" name="Rectangle 4"/>
+          <p:cNvSpPr/>
+          <p:nvPr/>
+        </p:nvSpPr>
+        <p:spPr>
+          <a:xfrm>
+            <a:off x="5371514" y="4457113"/>
+            <a:ext cx="2096087" cy="1069145"/>
+          </a:xfrm>
+          <a:prstGeom prst="rect">
+            <a:avLst/>
+          </a:prstGeom>
+        </p:spPr>
+        <p:style>
+          <a:lnRef idx="2">
+            <a:schemeClr val="accent1">
+              <a:shade val="50000"/>
+            </a:schemeClr>
+          </a:lnRef>
+          <a:fillRef idx="1">
+            <a:schemeClr val="accent1"/>
+          </a:fillRef>
+          <a:effectRef idx="0">
+            <a:schemeClr val="accent1"/>
+          </a:effectRef>
+          <a:fontRef idx="minor">
+            <a:schemeClr val="lt1"/>
+          </a:fontRef>
+        </p:style>
+        <p:txBody>
+          <a:bodyPr rtlCol="0" anchor="ctr"/>
+          <a:lstStyle/>
+          <a:p>
+            <a:pPr algn="ctr"/>
+            <a:r>
+              <a:rPr lang="fr-FR" dirty="0" smtClean="0"/>
+              <a:t>Article-table</a:t>
+            </a:r>
+            <a:endParaRPr lang="fr-FR" dirty="0"/>
+          </a:p>
+        </p:txBody>
+      </p:sp>
+      <p:cxnSp>
+        <p:nvCxnSpPr>
+          <p:cNvPr id="7" name="Connecteur droit avec flèche 6"/>
+          <p:cNvCxnSpPr>
+            <a:stCxn id="4" idx="3"/>
+            <a:endCxn id="5" idx="0"/>
+          </p:cNvCxnSpPr>
+          <p:nvPr/>
+        </p:nvCxnSpPr>
+        <p:spPr>
+          <a:xfrm>
+            <a:off x="3404382" y="2405576"/>
+            <a:ext cx="3015176" cy="2051537"/>
+          </a:xfrm>
+          <a:prstGeom prst="straightConnector1">
+            <a:avLst/>
+          </a:prstGeom>
+          <a:ln w="76200">
+            <a:tailEnd type="triangle"/>
+          </a:ln>
+        </p:spPr>
+        <p:style>
+          <a:lnRef idx="1">
+            <a:schemeClr val="accent1"/>
+          </a:lnRef>
+          <a:fillRef idx="0">
+            <a:schemeClr val="accent1"/>
+          </a:fillRef>
+          <a:effectRef idx="0">
+            <a:schemeClr val="accent1"/>
+          </a:effectRef>
+          <a:fontRef idx="minor">
+            <a:schemeClr val="tx1"/>
+          </a:fontRef>
+        </p:style>
+      </p:cxnSp>
+      <p:sp>
+        <p:nvSpPr>
+          <p:cNvPr id="9" name="ZoneTexte 8"/>
+          <p:cNvSpPr txBox="1"/>
+          <p:nvPr/>
+        </p:nvSpPr>
+        <p:spPr>
+          <a:xfrm>
+            <a:off x="4881489" y="2715065"/>
+            <a:ext cx="1762021" cy="369332"/>
+          </a:xfrm>
+          <a:prstGeom prst="rect">
+            <a:avLst/>
+          </a:prstGeom>
+          <a:noFill/>
+        </p:spPr>
+        <p:txBody>
+          <a:bodyPr wrap="none" rtlCol="0">
+            <a:spAutoFit/>
+          </a:bodyPr>
+          <a:lstStyle/>
+          <a:p>
+            <a:r>
+              <a:rPr lang="fr-FR" dirty="0" smtClean="0"/>
+              <a:t>@Input() articles</a:t>
+            </a:r>
+            <a:endParaRPr lang="fr-FR" dirty="0"/>
+          </a:p>
+        </p:txBody>
+      </p:sp>
+      <p:cxnSp>
+        <p:nvCxnSpPr>
+          <p:cNvPr id="11" name="Connecteur droit avec flèche 10"/>
+          <p:cNvCxnSpPr>
+            <a:stCxn id="5" idx="1"/>
+            <a:endCxn id="4" idx="2"/>
+          </p:cNvCxnSpPr>
+          <p:nvPr/>
+        </p:nvCxnSpPr>
+        <p:spPr>
+          <a:xfrm flipH="1" flipV="1">
+            <a:off x="2356339" y="2940148"/>
+            <a:ext cx="3015175" cy="2051538"/>
+          </a:xfrm>
+          <a:prstGeom prst="straightConnector1">
+            <a:avLst/>
+          </a:prstGeom>
+          <a:ln w="76200">
+            <a:tailEnd type="triangle"/>
+          </a:ln>
+        </p:spPr>
+        <p:style>
+          <a:lnRef idx="1">
+            <a:schemeClr val="accent1"/>
+          </a:lnRef>
+          <a:fillRef idx="0">
+            <a:schemeClr val="accent1"/>
+          </a:fillRef>
+          <a:effectRef idx="0">
+            <a:schemeClr val="accent1"/>
+          </a:effectRef>
+          <a:fontRef idx="minor">
+            <a:schemeClr val="tx1"/>
+          </a:fontRef>
+        </p:style>
+      </p:cxnSp>
+      <p:sp>
+        <p:nvSpPr>
+          <p:cNvPr id="12" name="ZoneTexte 11"/>
+          <p:cNvSpPr txBox="1"/>
+          <p:nvPr/>
+        </p:nvSpPr>
+        <p:spPr>
+          <a:xfrm>
+            <a:off x="986860" y="4704974"/>
+            <a:ext cx="2738955" cy="369332"/>
+          </a:xfrm>
+          <a:prstGeom prst="rect">
+            <a:avLst/>
+          </a:prstGeom>
+          <a:noFill/>
+        </p:spPr>
+        <p:txBody>
+          <a:bodyPr wrap="none" rtlCol="0">
+            <a:spAutoFit/>
+          </a:bodyPr>
+          <a:lstStyle/>
+          <a:p>
+            <a:r>
+              <a:rPr lang="fr-FR" dirty="0" smtClean="0"/>
+              <a:t>@Output() </a:t>
+            </a:r>
+            <a:r>
+              <a:rPr lang="fr-FR" dirty="0" err="1" smtClean="0"/>
+              <a:t>selectedArticles</a:t>
             </a:r>
             <a:endParaRPr lang="fr-FR" dirty="0"/>
           </a:p>
@@ -7708,7 +8098,7 @@
     </p:spTree>
     <p:extLst>
       <p:ext uri="{BB962C8B-B14F-4D97-AF65-F5344CB8AC3E}">
-        <p14:creationId xmlns:p14="http://schemas.microsoft.com/office/powerpoint/2010/main" val="2030539317"/>
+        <p14:creationId xmlns:p14="http://schemas.microsoft.com/office/powerpoint/2010/main" val="2577837329"/>
       </p:ext>
     </p:extLst>
   </p:cSld>
@@ -8157,6 +8547,266 @@
 </p:sld>
 </file>
 
+<file path=ppt/slides/slide20.xml><?xml version="1.0" encoding="utf-8"?>
+<p:sld xmlns:a="http://schemas.openxmlformats.org/drawingml/2006/main" xmlns:r="http://schemas.openxmlformats.org/officeDocument/2006/relationships" xmlns:p="http://schemas.openxmlformats.org/presentationml/2006/main">
+  <p:cSld>
+    <p:spTree>
+      <p:nvGrpSpPr>
+        <p:cNvPr id="1" name=""/>
+        <p:cNvGrpSpPr/>
+        <p:nvPr/>
+      </p:nvGrpSpPr>
+      <p:grpSpPr>
+        <a:xfrm>
+          <a:off x="0" y="0"/>
+          <a:ext cx="0" cy="0"/>
+          <a:chOff x="0" y="0"/>
+          <a:chExt cx="0" cy="0"/>
+        </a:xfrm>
+      </p:grpSpPr>
+      <p:sp>
+        <p:nvSpPr>
+          <p:cNvPr id="2" name="Titre 1"/>
+          <p:cNvSpPr>
+            <a:spLocks noGrp="1"/>
+          </p:cNvSpPr>
+          <p:nvPr>
+            <p:ph type="title"/>
+          </p:nvPr>
+        </p:nvSpPr>
+        <p:spPr/>
+        <p:txBody>
+          <a:bodyPr/>
+          <a:lstStyle/>
+          <a:p>
+            <a:r>
+              <a:rPr lang="fr-FR" dirty="0" smtClean="0"/>
+              <a:t>REST</a:t>
+            </a:r>
+            <a:endParaRPr lang="fr-FR" dirty="0"/>
+          </a:p>
+        </p:txBody>
+      </p:sp>
+      <p:sp>
+        <p:nvSpPr>
+          <p:cNvPr id="3" name="Espace réservé du contenu 2"/>
+          <p:cNvSpPr>
+            <a:spLocks noGrp="1"/>
+          </p:cNvSpPr>
+          <p:nvPr>
+            <p:ph idx="1"/>
+          </p:nvPr>
+        </p:nvSpPr>
+        <p:spPr/>
+        <p:txBody>
+          <a:bodyPr/>
+          <a:lstStyle/>
+          <a:p>
+            <a:r>
+              <a:rPr lang="fr-FR" dirty="0" smtClean="0"/>
+              <a:t>CRUD : </a:t>
+            </a:r>
+            <a:r>
+              <a:rPr lang="fr-FR" dirty="0" err="1" smtClean="0"/>
+              <a:t>Create</a:t>
+            </a:r>
+            <a:r>
+              <a:rPr lang="fr-FR" dirty="0" smtClean="0"/>
+              <a:t> </a:t>
+            </a:r>
+            <a:r>
+              <a:rPr lang="fr-FR" dirty="0" err="1" smtClean="0"/>
+              <a:t>Retrieve</a:t>
+            </a:r>
+            <a:r>
+              <a:rPr lang="fr-FR" dirty="0" smtClean="0"/>
+              <a:t> Update </a:t>
+            </a:r>
+            <a:r>
+              <a:rPr lang="fr-FR" dirty="0" err="1" smtClean="0"/>
+              <a:t>Delete</a:t>
+            </a:r>
+            <a:endParaRPr lang="fr-FR" dirty="0" smtClean="0"/>
+          </a:p>
+          <a:p>
+            <a:r>
+              <a:rPr lang="fr-FR" dirty="0" err="1" smtClean="0"/>
+              <a:t>Retrieve</a:t>
+            </a:r>
+            <a:r>
+              <a:rPr lang="fr-FR" dirty="0" smtClean="0"/>
+              <a:t> all: GET /articles (200)</a:t>
+            </a:r>
+          </a:p>
+          <a:p>
+            <a:pPr lvl="1"/>
+            <a:r>
+              <a:rPr lang="fr-FR" dirty="0" err="1" smtClean="0"/>
+              <a:t>Retrieve</a:t>
+            </a:r>
+            <a:r>
+              <a:rPr lang="fr-FR" dirty="0" smtClean="0"/>
+              <a:t> one: GET /articles/:id (200)</a:t>
+            </a:r>
+          </a:p>
+          <a:p>
+            <a:r>
+              <a:rPr lang="fr-FR" dirty="0" err="1" smtClean="0"/>
+              <a:t>Create</a:t>
+            </a:r>
+            <a:r>
+              <a:rPr lang="fr-FR" dirty="0" smtClean="0"/>
+              <a:t> one: POST /articles (201)</a:t>
+            </a:r>
+          </a:p>
+          <a:p>
+            <a:r>
+              <a:rPr lang="fr-FR" dirty="0" smtClean="0"/>
+              <a:t>Update</a:t>
+            </a:r>
+          </a:p>
+          <a:p>
+            <a:pPr lvl="1"/>
+            <a:r>
+              <a:rPr lang="fr-FR" dirty="0" smtClean="0"/>
+              <a:t>Rewrite: PUT /articles/:id (204)</a:t>
+            </a:r>
+          </a:p>
+          <a:p>
+            <a:pPr lvl="1"/>
+            <a:r>
+              <a:rPr lang="fr-FR" dirty="0" smtClean="0"/>
+              <a:t>Patch: PATCH </a:t>
+            </a:r>
+            <a:r>
+              <a:rPr lang="fr-FR" dirty="0"/>
+              <a:t>/articles/:id (</a:t>
+            </a:r>
+            <a:r>
+              <a:rPr lang="fr-FR" dirty="0" smtClean="0"/>
+              <a:t>204)</a:t>
+            </a:r>
+            <a:endParaRPr lang="fr-FR" dirty="0"/>
+          </a:p>
+          <a:p>
+            <a:r>
+              <a:rPr lang="fr-FR" dirty="0" err="1" smtClean="0"/>
+              <a:t>Delete</a:t>
+            </a:r>
+            <a:r>
+              <a:rPr lang="fr-FR" dirty="0" smtClean="0"/>
+              <a:t> /articles</a:t>
+            </a:r>
+          </a:p>
+          <a:p>
+            <a:endParaRPr lang="fr-FR" dirty="0" smtClean="0"/>
+          </a:p>
+          <a:p>
+            <a:endParaRPr lang="fr-FR" dirty="0"/>
+          </a:p>
+        </p:txBody>
+      </p:sp>
+    </p:spTree>
+    <p:extLst>
+      <p:ext uri="{BB962C8B-B14F-4D97-AF65-F5344CB8AC3E}">
+        <p14:creationId xmlns:p14="http://schemas.microsoft.com/office/powerpoint/2010/main" val="1152547774"/>
+      </p:ext>
+    </p:extLst>
+  </p:cSld>
+  <p:clrMapOvr>
+    <a:masterClrMapping/>
+  </p:clrMapOvr>
+</p:sld>
+</file>
+
+<file path=ppt/slides/slide21.xml><?xml version="1.0" encoding="utf-8"?>
+<p:sld xmlns:a="http://schemas.openxmlformats.org/drawingml/2006/main" xmlns:r="http://schemas.openxmlformats.org/officeDocument/2006/relationships" xmlns:p="http://schemas.openxmlformats.org/presentationml/2006/main">
+  <p:cSld>
+    <p:spTree>
+      <p:nvGrpSpPr>
+        <p:cNvPr id="1" name=""/>
+        <p:cNvGrpSpPr/>
+        <p:nvPr/>
+      </p:nvGrpSpPr>
+      <p:grpSpPr>
+        <a:xfrm>
+          <a:off x="0" y="0"/>
+          <a:ext cx="0" cy="0"/>
+          <a:chOff x="0" y="0"/>
+          <a:chExt cx="0" cy="0"/>
+        </a:xfrm>
+      </p:grpSpPr>
+      <p:sp>
+        <p:nvSpPr>
+          <p:cNvPr id="2" name="Titre 1"/>
+          <p:cNvSpPr>
+            <a:spLocks noGrp="1"/>
+          </p:cNvSpPr>
+          <p:nvPr>
+            <p:ph type="title"/>
+          </p:nvPr>
+        </p:nvSpPr>
+        <p:spPr/>
+        <p:txBody>
+          <a:bodyPr/>
+          <a:lstStyle/>
+          <a:p>
+            <a:r>
+              <a:rPr lang="fr-FR" dirty="0" smtClean="0"/>
+              <a:t>webographie</a:t>
+            </a:r>
+            <a:endParaRPr lang="fr-FR" dirty="0"/>
+          </a:p>
+        </p:txBody>
+      </p:sp>
+      <p:sp>
+        <p:nvSpPr>
+          <p:cNvPr id="3" name="Espace réservé du contenu 2"/>
+          <p:cNvSpPr>
+            <a:spLocks noGrp="1"/>
+          </p:cNvSpPr>
+          <p:nvPr>
+            <p:ph idx="1"/>
+          </p:nvPr>
+        </p:nvSpPr>
+        <p:spPr/>
+        <p:txBody>
+          <a:bodyPr/>
+          <a:lstStyle/>
+          <a:p>
+            <a:r>
+              <a:rPr lang="en-US" dirty="0" err="1"/>
+              <a:t>susan</a:t>
+            </a:r>
+            <a:r>
+              <a:rPr lang="en-US" dirty="0"/>
+              <a:t> </a:t>
+            </a:r>
+            <a:r>
+              <a:rPr lang="en-US" dirty="0" err="1"/>
+              <a:t>weinschenk</a:t>
+            </a:r>
+            <a:r>
+              <a:rPr lang="en-US" dirty="0"/>
+              <a:t> 100 things every designer needs to know about people pdf</a:t>
+            </a:r>
+            <a:endParaRPr lang="fr-FR" dirty="0"/>
+          </a:p>
+        </p:txBody>
+      </p:sp>
+    </p:spTree>
+    <p:extLst>
+      <p:ext uri="{BB962C8B-B14F-4D97-AF65-F5344CB8AC3E}">
+        <p14:creationId xmlns:p14="http://schemas.microsoft.com/office/powerpoint/2010/main" val="2030539317"/>
+      </p:ext>
+    </p:extLst>
+  </p:cSld>
+  <p:clrMapOvr>
+    <a:masterClrMapping/>
+  </p:clrMapOvr>
+</p:sld>
+</file>
+
 <file path=ppt/slides/slide3.xml><?xml version="1.0" encoding="utf-8"?>
 <p:sld xmlns:a="http://schemas.openxmlformats.org/drawingml/2006/main" xmlns:r="http://schemas.openxmlformats.org/officeDocument/2006/relationships" xmlns:p="http://schemas.openxmlformats.org/presentationml/2006/main">
   <p:cSld>
@@ -8213,7 +8863,9 @@
         </p:nvSpPr>
         <p:spPr/>
         <p:txBody>
-          <a:bodyPr/>
+          <a:bodyPr>
+            <a:normAutofit lnSpcReduction="10000"/>
+          </a:bodyPr>
           <a:lstStyle/>
           <a:p>
             <a:r>
@@ -8309,6 +8961,13 @@
             <a:r>
               <a:rPr lang="fr-FR" dirty="0" err="1" smtClean="0"/>
               <a:t>Snippet</a:t>
+            </a:r>
+            <a:endParaRPr lang="fr-FR" dirty="0" smtClean="0"/>
+          </a:p>
+          <a:p>
+            <a:r>
+              <a:rPr lang="fr-FR" smtClean="0"/>
+              <a:t>SonarLint</a:t>
             </a:r>
             <a:endParaRPr lang="fr-FR" dirty="0" smtClean="0"/>
           </a:p>

</xml_diff>